<commit_message>
Updated banner and desc
</commit_message>
<xml_diff>
--- a/assets/img/eppmc_imgs.pptx
+++ b/assets/img/eppmc_imgs.pptx
@@ -3419,8 +3419,8 @@
         </p:nvSpPr>
         <p:spPr>
           <a:xfrm>
-            <a:off x="2607733" y="3516096"/>
-            <a:ext cx="4964854" cy="1077218"/>
+            <a:off x="2446768" y="3586469"/>
+            <a:ext cx="4964854" cy="984885"/>
           </a:xfrm>
           <a:prstGeom prst="rect">
             <a:avLst/>
@@ -3434,20 +3434,16 @@
           <a:lstStyle/>
           <a:p>
             <a:r>
-              <a:rPr lang="en-US" sz="3200" b="1" dirty="0">
+              <a:rPr lang="en-US" sz="2900" b="1" dirty="0">
                 <a:solidFill>
                   <a:srgbClr val="B72473"/>
                 </a:solidFill>
-                <a:latin typeface="Quattrocento Sans" panose="020B0502050000020003" pitchFamily="34" charset="0"/>
+                <a:latin typeface="Open Sans" panose="020B0606030504020204" pitchFamily="34" charset="0"/>
+                <a:ea typeface="Open Sans" panose="020B0606030504020204" pitchFamily="34" charset="0"/>
+                <a:cs typeface="Open Sans" panose="020B0606030504020204" pitchFamily="34" charset="0"/>
               </a:rPr>
               <a:t>Emotion Phenomenology and Physiology Challenge</a:t>
             </a:r>
-            <a:endParaRPr lang="en-US" sz="2400" b="1" dirty="0">
-              <a:solidFill>
-                <a:srgbClr val="B72473"/>
-              </a:solidFill>
-              <a:latin typeface="Quattrocento Sans" panose="020B0502050000020003" pitchFamily="34" charset="0"/>
-            </a:endParaRPr>
           </a:p>
         </p:txBody>
       </p:sp>

</xml_diff>